<commit_message>
Updates to visualization lessons + answers
</commit_message>
<xml_diff>
--- a/presentations/pptx/02-Plotting with ggplot2.pptx
+++ b/presentations/pptx/02-Plotting with ggplot2.pptx
@@ -5,7 +5,7 @@
     <p:sldMasterId id="2147483840" r:id="rId1"/>
   </p:sldMasterIdLst>
   <p:notesMasterIdLst>
-    <p:notesMasterId r:id="rId14"/>
+    <p:notesMasterId r:id="rId15"/>
   </p:notesMasterIdLst>
   <p:sldIdLst>
     <p:sldId id="256" r:id="rId2"/>
@@ -19,7 +19,8 @@
     <p:sldId id="263" r:id="rId10"/>
     <p:sldId id="265" r:id="rId11"/>
     <p:sldId id="266" r:id="rId12"/>
-    <p:sldId id="267" r:id="rId13"/>
+    <p:sldId id="268" r:id="rId13"/>
+    <p:sldId id="267" r:id="rId14"/>
   </p:sldIdLst>
   <p:sldSz cx="12192000" cy="6858000"/>
   <p:notesSz cx="6858000" cy="9144000"/>
@@ -219,7 +220,7 @@
           <a:p>
             <a:fld id="{5C93CA8F-50F8-44B5-B48F-4C4452AC4FCB}" type="datetimeFigureOut">
               <a:rPr lang="he-IL" smtClean="0"/>
-              <a:t>י"ט/אדר ב/תשע"ט</a:t>
+              <a:t>כ'/אדר ב/תשע"ט</a:t>
             </a:fld>
             <a:endParaRPr lang="he-IL"/>
           </a:p>
@@ -5325,6 +5326,251 @@
           <p:cNvPr id="2" name="Title 1">
             <a:extLst>
               <a:ext uri="{FF2B5EF4-FFF2-40B4-BE49-F238E27FC236}">
+                <a16:creationId xmlns:a16="http://schemas.microsoft.com/office/drawing/2014/main" id="{2611ADA1-9A7F-4E33-85E2-9F46EAD0FF7E}"/>
+              </a:ext>
+            </a:extLst>
+          </p:cNvPr>
+          <p:cNvSpPr>
+            <a:spLocks noGrp="1"/>
+          </p:cNvSpPr>
+          <p:nvPr>
+            <p:ph type="title"/>
+          </p:nvPr>
+        </p:nvSpPr>
+        <p:spPr/>
+        <p:txBody>
+          <a:bodyPr/>
+          <a:lstStyle/>
+          <a:p>
+            <a:r>
+              <a:rPr lang="en-US" dirty="0" err="1"/>
+              <a:t>tidyverse</a:t>
+            </a:r>
+            <a:r>
+              <a:rPr lang="en-US" dirty="0"/>
+              <a:t> prerequisites</a:t>
+            </a:r>
+            <a:endParaRPr lang="en-IL" dirty="0"/>
+          </a:p>
+        </p:txBody>
+      </p:sp>
+      <p:sp>
+        <p:nvSpPr>
+          <p:cNvPr id="3" name="Content Placeholder 2">
+            <a:extLst>
+              <a:ext uri="{FF2B5EF4-FFF2-40B4-BE49-F238E27FC236}">
+                <a16:creationId xmlns:a16="http://schemas.microsoft.com/office/drawing/2014/main" id="{1344D0E0-D7BC-4206-A8F0-0CB1B65FA0A2}"/>
+              </a:ext>
+            </a:extLst>
+          </p:cNvPr>
+          <p:cNvSpPr>
+            <a:spLocks noGrp="1"/>
+          </p:cNvSpPr>
+          <p:nvPr>
+            <p:ph idx="1"/>
+          </p:nvPr>
+        </p:nvSpPr>
+        <p:spPr/>
+        <p:txBody>
+          <a:bodyPr/>
+          <a:lstStyle/>
+          <a:p>
+            <a:r>
+              <a:rPr lang="en-US" dirty="0"/>
+              <a:t>Throughout the exercise you might also have the chance to use the following </a:t>
+            </a:r>
+            <a:r>
+              <a:rPr lang="en-US" dirty="0" err="1"/>
+              <a:t>tidyverse</a:t>
+            </a:r>
+            <a:r>
+              <a:rPr lang="en-US" dirty="0"/>
+              <a:t> (</a:t>
+            </a:r>
+            <a:r>
+              <a:rPr lang="en-US" dirty="0" err="1"/>
+              <a:t>dplyr</a:t>
+            </a:r>
+            <a:r>
+              <a:rPr lang="en-US" dirty="0"/>
+              <a:t>) functions:</a:t>
+            </a:r>
+          </a:p>
+          <a:p>
+            <a:pPr lvl="1"/>
+            <a:r>
+              <a:rPr lang="en-US" dirty="0"/>
+              <a:t>mutate() – create a new variable</a:t>
+            </a:r>
+          </a:p>
+          <a:p>
+            <a:pPr lvl="1"/>
+            <a:r>
+              <a:rPr lang="en-US" dirty="0"/>
+              <a:t>glimpse() – show the first few values of each vector</a:t>
+            </a:r>
+          </a:p>
+          <a:p>
+            <a:pPr lvl="1"/>
+            <a:r>
+              <a:rPr lang="en-US" dirty="0"/>
+              <a:t>filter() – filter the data according to a specific condition</a:t>
+            </a:r>
+          </a:p>
+          <a:p>
+            <a:pPr lvl="1"/>
+            <a:r>
+              <a:rPr lang="en-US" dirty="0"/>
+              <a:t>count() – count the number of observations per each combination</a:t>
+            </a:r>
+          </a:p>
+          <a:p>
+            <a:pPr lvl="1"/>
+            <a:r>
+              <a:rPr lang="en-US" dirty="0" err="1"/>
+              <a:t>group_by</a:t>
+            </a:r>
+            <a:r>
+              <a:rPr lang="en-US" dirty="0"/>
+              <a:t>() – group the dataset by a specific set of variables</a:t>
+            </a:r>
+          </a:p>
+          <a:p>
+            <a:pPr lvl="1"/>
+            <a:r>
+              <a:rPr lang="en-US" dirty="0" err="1"/>
+              <a:t>summarise</a:t>
+            </a:r>
+            <a:r>
+              <a:rPr lang="en-US" dirty="0"/>
+              <a:t>() – conduct summarizing operations (like mean or sum) according to the dataset’s grouping</a:t>
+            </a:r>
+          </a:p>
+          <a:p>
+            <a:pPr lvl="1"/>
+            <a:r>
+              <a:rPr lang="en-US" dirty="0"/>
+              <a:t>%&gt;% pipe operator</a:t>
+            </a:r>
+          </a:p>
+          <a:p>
+            <a:pPr lvl="1"/>
+            <a:endParaRPr lang="en-US" dirty="0"/>
+          </a:p>
+          <a:p>
+            <a:r>
+              <a:rPr lang="en-US" dirty="0"/>
+              <a:t>Lets demonstrate these over a live R session, via the </a:t>
+            </a:r>
+            <a:r>
+              <a:rPr lang="en-US" i="1" dirty="0" err="1"/>
+              <a:t>mtcars</a:t>
+            </a:r>
+            <a:r>
+              <a:rPr lang="en-US" i="1" dirty="0"/>
+              <a:t> </a:t>
+            </a:r>
+            <a:r>
+              <a:rPr lang="en-US" dirty="0"/>
+              <a:t>dataset.</a:t>
+            </a:r>
+            <a:endParaRPr lang="en-IL" dirty="0"/>
+          </a:p>
+        </p:txBody>
+      </p:sp>
+      <p:sp>
+        <p:nvSpPr>
+          <p:cNvPr id="4" name="Footer Placeholder 3">
+            <a:extLst>
+              <a:ext uri="{FF2B5EF4-FFF2-40B4-BE49-F238E27FC236}">
+                <a16:creationId xmlns:a16="http://schemas.microsoft.com/office/drawing/2014/main" id="{3F8EBD3F-B0EB-460D-B12C-DC32D0586615}"/>
+              </a:ext>
+            </a:extLst>
+          </p:cNvPr>
+          <p:cNvSpPr>
+            <a:spLocks noGrp="1"/>
+          </p:cNvSpPr>
+          <p:nvPr>
+            <p:ph type="ftr" sz="quarter" idx="11"/>
+          </p:nvPr>
+        </p:nvSpPr>
+        <p:spPr/>
+        <p:txBody>
+          <a:bodyPr/>
+          <a:lstStyle/>
+          <a:p>
+            <a:r>
+              <a:rPr lang="en-US"/>
+              <a:t>Materials by Adi Sarid https://adisarid.github.io and http://www.sarid-ins.com</a:t>
+            </a:r>
+            <a:endParaRPr lang="en-US" dirty="0"/>
+          </a:p>
+        </p:txBody>
+      </p:sp>
+      <p:sp>
+        <p:nvSpPr>
+          <p:cNvPr id="5" name="Slide Number Placeholder 4">
+            <a:extLst>
+              <a:ext uri="{FF2B5EF4-FFF2-40B4-BE49-F238E27FC236}">
+                <a16:creationId xmlns:a16="http://schemas.microsoft.com/office/drawing/2014/main" id="{6F2E5ED5-CF19-4EF4-A0F9-D5D8330A6D47}"/>
+              </a:ext>
+            </a:extLst>
+          </p:cNvPr>
+          <p:cNvSpPr>
+            <a:spLocks noGrp="1"/>
+          </p:cNvSpPr>
+          <p:nvPr>
+            <p:ph type="sldNum" sz="quarter" idx="12"/>
+          </p:nvPr>
+        </p:nvSpPr>
+        <p:spPr/>
+        <p:txBody>
+          <a:bodyPr/>
+          <a:lstStyle/>
+          <a:p>
+            <a:fld id="{4FAB73BC-B049-4115-A692-8D63A059BFB8}" type="slidenum">
+              <a:rPr lang="en-US" smtClean="0"/>
+              <a:t>12</a:t>
+            </a:fld>
+            <a:endParaRPr lang="en-US" dirty="0"/>
+          </a:p>
+        </p:txBody>
+      </p:sp>
+    </p:spTree>
+    <p:extLst>
+      <p:ext uri="{BB962C8B-B14F-4D97-AF65-F5344CB8AC3E}">
+        <p14:creationId xmlns:p14="http://schemas.microsoft.com/office/powerpoint/2010/main" val="1663902926"/>
+      </p:ext>
+    </p:extLst>
+  </p:cSld>
+  <p:clrMapOvr>
+    <a:masterClrMapping/>
+  </p:clrMapOvr>
+</p:sld>
+</file>
+
+<file path=ppt/slides/slide13.xml><?xml version="1.0" encoding="utf-8"?>
+<p:sld xmlns:a="http://schemas.openxmlformats.org/drawingml/2006/main" xmlns:r="http://schemas.openxmlformats.org/officeDocument/2006/relationships" xmlns:p="http://schemas.openxmlformats.org/presentationml/2006/main">
+  <p:cSld>
+    <p:spTree>
+      <p:nvGrpSpPr>
+        <p:cNvPr id="1" name=""/>
+        <p:cNvGrpSpPr/>
+        <p:nvPr/>
+      </p:nvGrpSpPr>
+      <p:grpSpPr>
+        <a:xfrm>
+          <a:off x="0" y="0"/>
+          <a:ext cx="0" cy="0"/>
+          <a:chOff x="0" y="0"/>
+          <a:chExt cx="0" cy="0"/>
+        </a:xfrm>
+      </p:grpSpPr>
+      <p:sp>
+        <p:nvSpPr>
+          <p:cNvPr id="2" name="Title 1">
+            <a:extLst>
+              <a:ext uri="{FF2B5EF4-FFF2-40B4-BE49-F238E27FC236}">
                 <a16:creationId xmlns:a16="http://schemas.microsoft.com/office/drawing/2014/main" id="{ADA01FEA-EE45-4752-AEFA-585F15DC2941}"/>
               </a:ext>
             </a:extLst>
@@ -5372,7 +5618,22 @@
           <a:p>
             <a:r>
               <a:rPr lang="en-US" dirty="0"/>
-              <a:t>From the exercise folder open 02-Plotting.Rmd</a:t>
+              <a:t>From the exercise folder open 02-Plotting.Rmd and start </a:t>
+            </a:r>
+          </a:p>
+          <a:p>
+            <a:pPr lvl="1"/>
+            <a:r>
+              <a:rPr lang="en-US" dirty="0"/>
+              <a:t>“Exercise 1: the </a:t>
+            </a:r>
+            <a:r>
+              <a:rPr lang="en-US" i="1" dirty="0"/>
+              <a:t>google play</a:t>
+            </a:r>
+            <a:r>
+              <a:rPr lang="en-US" dirty="0"/>
+              <a:t> dataset”</a:t>
             </a:r>
           </a:p>
           <a:p>
@@ -5436,7 +5697,7 @@
           <a:p>
             <a:fld id="{4FAB73BC-B049-4115-A692-8D63A059BFB8}" type="slidenum">
               <a:rPr lang="en-US" smtClean="0"/>
-              <a:t>12</a:t>
+              <a:t>13</a:t>
             </a:fld>
             <a:endParaRPr lang="en-US" dirty="0"/>
           </a:p>

</xml_diff>

<commit_message>
Adding the updated presentation
</commit_message>
<xml_diff>
--- a/presentations/pptx/02-Plotting with ggplot2.pptx
+++ b/presentations/pptx/02-Plotting with ggplot2.pptx
@@ -223,7 +223,7 @@
           <a:p>
             <a:fld id="{5C93CA8F-50F8-44B5-B48F-4C4452AC4FCB}" type="datetimeFigureOut">
               <a:rPr lang="he-IL" smtClean="0"/>
-              <a:t>כ'/אדר ב/תשע"ט</a:t>
+              <a:t>כ"א/אדר ב/תשע"ט</a:t>
             </a:fld>
             <a:endParaRPr lang="he-IL"/>
           </a:p>
@@ -4717,6 +4717,10 @@
           <a:bodyPr/>
           <a:lstStyle/>
           <a:p>
+            <a:r>
+              <a:rPr lang="en-US"/>
+              <a:t> </a:t>
+            </a:r>
             <a:endParaRPr lang="he-IL" dirty="0"/>
           </a:p>
         </p:txBody>

</xml_diff>